<commit_message>
Added quote of the day
</commit_message>
<xml_diff>
--- a/presentation/pptx/00-Introduction.pptx
+++ b/presentation/pptx/00-Introduction.pptx
@@ -4817,6 +4817,54 @@
           </a:p>
         </p:txBody>
       </p:sp>
+      <p:sp>
+        <p:nvSpPr>
+          <p:cNvPr id="4" name="TextBox 3"/>
+          <p:cNvSpPr txBox="1"/>
+          <p:nvPr/>
+        </p:nvSpPr>
+        <p:spPr>
+          <a:xfrm>
+            <a:off x="4270786" y="5335798"/>
+            <a:ext cx="6845144" cy="923330"/>
+          </a:xfrm>
+          <a:prstGeom prst="rect">
+            <a:avLst/>
+          </a:prstGeom>
+          <a:noFill/>
+        </p:spPr>
+        <p:txBody>
+          <a:bodyPr wrap="none" rtlCol="1">
+            <a:spAutoFit/>
+          </a:bodyPr>
+          <a:lstStyle/>
+          <a:p>
+            <a:r>
+              <a:rPr lang="en-US" i="1" dirty="0" smtClean="0"/>
+              <a:t>“Somewhere</a:t>
+            </a:r>
+            <a:r>
+              <a:rPr lang="en-US" i="1" dirty="0"/>
+              <a:t>, something incredible is waiting to be known</a:t>
+            </a:r>
+            <a:r>
+              <a:rPr lang="en-US" i="1" dirty="0" smtClean="0"/>
+              <a:t>.”</a:t>
+            </a:r>
+          </a:p>
+          <a:p>
+            <a:endParaRPr lang="en-US" dirty="0"/>
+          </a:p>
+          <a:p>
+            <a:pPr algn="r"/>
+            <a:r>
+              <a:rPr lang="en-US" dirty="0" smtClean="0"/>
+              <a:t>- Carl Sagan</a:t>
+            </a:r>
+            <a:endParaRPr lang="he-IL" dirty="0"/>
+          </a:p>
+        </p:txBody>
+      </p:sp>
     </p:spTree>
     <p:extLst>
       <p:ext uri="{BB962C8B-B14F-4D97-AF65-F5344CB8AC3E}">
@@ -5113,40 +5161,20 @@
             </a:r>
             <a:r>
               <a:rPr lang="en-US" sz="2400" dirty="0" smtClean="0"/>
-              <a:t> in </a:t>
-            </a:r>
+              <a:t> in R</a:t>
+            </a:r>
+            <a:endParaRPr lang="en-US" sz="2400" b="1" dirty="0"/>
+          </a:p>
+          <a:p>
             <a:r>
               <a:rPr lang="en-US" sz="2400" dirty="0" smtClean="0"/>
-              <a:t>R</a:t>
-            </a:r>
-            <a:endParaRPr lang="en-US" sz="2400" b="1" dirty="0"/>
+              <a:t>This course will in part resemble an “academic course”, </a:t>
+            </a:r>
           </a:p>
           <a:p>
             <a:r>
               <a:rPr lang="en-US" sz="2400" dirty="0" smtClean="0"/>
-              <a:t>This course will </a:t>
-            </a:r>
-            <a:r>
-              <a:rPr lang="en-US" sz="2400" dirty="0" smtClean="0"/>
-              <a:t>in part resemble </a:t>
-            </a:r>
-            <a:r>
-              <a:rPr lang="en-US" sz="2400" dirty="0" smtClean="0"/>
-              <a:t>an “academic course”, </a:t>
-            </a:r>
-          </a:p>
-          <a:p>
-            <a:r>
-              <a:rPr lang="en-US" sz="2400" dirty="0" smtClean="0"/>
-              <a:t>But not to make it too </a:t>
-            </a:r>
-            <a:r>
-              <a:rPr lang="en-US" sz="2400" dirty="0" smtClean="0"/>
-              <a:t>dry or math technical we </a:t>
-            </a:r>
-            <a:r>
-              <a:rPr lang="en-US" sz="2400" dirty="0" smtClean="0"/>
-              <a:t>will have some “hands-on”</a:t>
+              <a:t>But not to make it too dry or math technical we will have some “hands-on”</a:t>
             </a:r>
           </a:p>
           <a:p>
@@ -5363,15 +5391,7 @@
             </a:r>
             <a:r>
               <a:rPr lang="en-US" dirty="0" smtClean="0"/>
-              <a:t>, shrinkage, PCA, </a:t>
-            </a:r>
-            <a:r>
-              <a:rPr lang="en-US" dirty="0" smtClean="0"/>
-              <a:t>feature </a:t>
-            </a:r>
-            <a:r>
-              <a:rPr lang="en-US" dirty="0" smtClean="0"/>
-              <a:t>selection, relative importance)</a:t>
+              <a:t>, shrinkage, PCA, feature selection, relative importance)</a:t>
             </a:r>
           </a:p>
           <a:p>

</xml_diff>